<commit_message>
Made small changes to final section of poster
Added small section about further expanding our accessibility features.
</commit_message>
<xml_diff>
--- a/Breadbox Poster Final.pptx
+++ b/Breadbox Poster Final.pptx
@@ -8196,7 +8196,7 @@
         <p:spPr bwMode="auto">
           <a:xfrm>
             <a:off x="14447338" y="18818094"/>
-            <a:ext cx="6429476" cy="5897073"/>
+            <a:ext cx="6429476" cy="7431625"/>
           </a:xfrm>
           <a:prstGeom prst="rect">
             <a:avLst/>
@@ -8229,7 +8229,22 @@
             </a:pPr>
             <a:r>
               <a:rPr lang="en-GB" dirty="0"/>
-              <a:t>Working on this project has been a very informative experience into the process of agile development. Overall, the project ran smoothly other than a setback at the beginning due to overestimation of the time we had available to us. This gave us a valuable insight into agile development and the sprint process. In future, we would look to fully recreate the site with our own creative twist while making the site mobile friendly and sticking to client requirements. We would also create a fully secure back-end system including a database to store data, such as user preferences and favourites, anonymously.  We would also look at adding a chatbot and possibly a forum to the site to allow interaction between users. </a:t>
+              <a:t>Working on this project has been a very informative experience into the process of agile development. Overall, the project ran smoothly other than a setback at the beginning due to overestimation of the time we had available to us. This gave us a valuable insight into agile development and the sprint process. In future, we would look to fully recreate the site with our own creative twist while making the site mobile friendly and sticking to client requirements. </a:t>
+            </a:r>
+          </a:p>
+          <a:p>
+            <a:pPr algn="just">
+              <a:defRPr/>
+            </a:pPr>
+            <a:endParaRPr lang="en-GB" dirty="0"/>
+          </a:p>
+          <a:p>
+            <a:pPr algn="just">
+              <a:defRPr/>
+            </a:pPr>
+            <a:r>
+              <a:rPr lang="en-GB" dirty="0"/>
+              <a:t>We would also look at fleshing out the accessibility features with more options to create as comfortable of a user experience as we can. Further, we would develop a fully secure back-end system including a database to store data, such as user preferences and favourites, anonymously.  We would also look at adding a chatbot and possibly a forum to the site to allow interaction between users. </a:t>
             </a:r>
             <a:endParaRPr dirty="0"/>
           </a:p>
@@ -8297,15 +8312,7 @@
             </a:pPr>
             <a:r>
               <a:rPr lang="en-GB" sz="2400" dirty="0"/>
-              <a:t>We worked well as a group by effectively delegating tasks to group members and making sure every group member played their part. Group members from the computing science background worked on the front-end prototype and coding, while the cyber security researched security </a:t>
-            </a:r>
-            <a:r>
-              <a:rPr lang="en-GB" sz="2400" dirty="0" err="1"/>
-              <a:t>guidlines</a:t>
-            </a:r>
-            <a:r>
-              <a:rPr lang="en-GB" sz="2400" dirty="0"/>
-              <a:t> that our site would have to follow and made sure that they were implemented into the code. Everyone in the group checked on each other’s progress to make sure that we progressed at a speed that would allow us to have a finished final product.  </a:t>
+              <a:t>We worked well as a group by effectively delegating tasks to group members and making sure every group member played their part. Group members from the computing science background worked on the front-end prototype and coding, while the cyber security researched security guidelines that our site would have to follow and made sure that they were implemented into the code. Everyone in the group checked on each other’s progress to make sure that we progressed at a speed that would allow us to have a finished final product.  </a:t>
             </a:r>
             <a:endParaRPr sz="2400" dirty="0"/>
           </a:p>

</xml_diff>